<commit_message>
Update documents after class.
</commit_message>
<xml_diff>
--- a/CPSC-24700/Presentations/session-04.pptx
+++ b/CPSC-24700/Presentations/session-04.pptx
@@ -5,18 +5,19 @@
     <p:sldMasterId id="2147483648" r:id="rId1"/>
   </p:sldMasterIdLst>
   <p:notesMasterIdLst>
-    <p:notesMasterId r:id="rId11"/>
+    <p:notesMasterId r:id="rId12"/>
   </p:notesMasterIdLst>
   <p:sldIdLst>
     <p:sldId id="257" r:id="rId2"/>
-    <p:sldId id="291" r:id="rId3"/>
-    <p:sldId id="279" r:id="rId4"/>
-    <p:sldId id="293" r:id="rId5"/>
-    <p:sldId id="290" r:id="rId6"/>
-    <p:sldId id="294" r:id="rId7"/>
-    <p:sldId id="281" r:id="rId8"/>
-    <p:sldId id="282" r:id="rId9"/>
-    <p:sldId id="263" r:id="rId10"/>
+    <p:sldId id="295" r:id="rId3"/>
+    <p:sldId id="291" r:id="rId4"/>
+    <p:sldId id="279" r:id="rId5"/>
+    <p:sldId id="293" r:id="rId6"/>
+    <p:sldId id="290" r:id="rId7"/>
+    <p:sldId id="294" r:id="rId8"/>
+    <p:sldId id="281" r:id="rId9"/>
+    <p:sldId id="282" r:id="rId10"/>
+    <p:sldId id="263" r:id="rId11"/>
   </p:sldIdLst>
   <p:sldSz cx="12192000" cy="6858000"/>
   <p:notesSz cx="7315200" cy="9601200"/>
@@ -637,7 +638,7 @@
           <a:p>
             <a:fld id="{23B99BB9-C7F6-43B3-A122-46088ABB36FB}" type="slidenum">
               <a:rPr lang="en-US" smtClean="0"/>
-              <a:t>2</a:t>
+              <a:t>3</a:t>
             </a:fld>
             <a:endParaRPr lang="en-US"/>
           </a:p>
@@ -730,7 +731,7 @@
           <a:p>
             <a:fld id="{5394DE12-7B9B-46AA-AC19-C30A49928B9B}" type="slidenum">
               <a:rPr lang="en-US" smtClean="0"/>
-              <a:t>3</a:t>
+              <a:t>4</a:t>
             </a:fld>
             <a:endParaRPr lang="en-US" dirty="0"/>
           </a:p>
@@ -814,7 +815,7 @@
           <a:p>
             <a:fld id="{23B99BB9-C7F6-43B3-A122-46088ABB36FB}" type="slidenum">
               <a:rPr lang="en-US" smtClean="0"/>
-              <a:t>4</a:t>
+              <a:t>5</a:t>
             </a:fld>
             <a:endParaRPr lang="en-US"/>
           </a:p>
@@ -964,7 +965,7 @@
           <a:p>
             <a:fld id="{23B99BB9-C7F6-43B3-A122-46088ABB36FB}" type="slidenum">
               <a:rPr lang="en-US" smtClean="0"/>
-              <a:t>5</a:t>
+              <a:t>6</a:t>
             </a:fld>
             <a:endParaRPr lang="en-US"/>
           </a:p>
@@ -1048,7 +1049,7 @@
           <a:p>
             <a:fld id="{23B99BB9-C7F6-43B3-A122-46088ABB36FB}" type="slidenum">
               <a:rPr lang="en-US" smtClean="0"/>
-              <a:t>6</a:t>
+              <a:t>7</a:t>
             </a:fld>
             <a:endParaRPr lang="en-US"/>
           </a:p>
@@ -1135,7 +1136,7 @@
           <a:p>
             <a:fld id="{23B99BB9-C7F6-43B3-A122-46088ABB36FB}" type="slidenum">
               <a:rPr lang="en-US" smtClean="0"/>
-              <a:t>7</a:t>
+              <a:t>8</a:t>
             </a:fld>
             <a:endParaRPr lang="en-US"/>
           </a:p>
@@ -1219,7 +1220,7 @@
           <a:p>
             <a:fld id="{5394DE12-7B9B-46AA-AC19-C30A49928B9B}" type="slidenum">
               <a:rPr lang="en-US" smtClean="0"/>
-              <a:t>8</a:t>
+              <a:t>9</a:t>
             </a:fld>
             <a:endParaRPr lang="en-US" dirty="0"/>
           </a:p>
@@ -1303,7 +1304,7 @@
           <a:p>
             <a:fld id="{5394DE12-7B9B-46AA-AC19-C30A49928B9B}" type="slidenum">
               <a:rPr lang="en-US" smtClean="0"/>
-              <a:t>9</a:t>
+              <a:t>10</a:t>
             </a:fld>
             <a:endParaRPr lang="en-US" dirty="0"/>
           </a:p>
@@ -4757,6 +4758,112 @@
 </p:sld>
 </file>
 
+<file path=ppt/slides/slide10.xml><?xml version="1.0" encoding="utf-8"?>
+<p:sld xmlns:a="http://schemas.openxmlformats.org/drawingml/2006/main" xmlns:r="http://schemas.openxmlformats.org/officeDocument/2006/relationships" xmlns:p="http://schemas.openxmlformats.org/presentationml/2006/main">
+  <p:cSld>
+    <p:bg>
+      <p:bgPr>
+        <a:solidFill>
+          <a:schemeClr val="bg1">
+            <a:lumMod val="75000"/>
+          </a:schemeClr>
+        </a:solidFill>
+        <a:effectLst/>
+      </p:bgPr>
+    </p:bg>
+    <p:spTree>
+      <p:nvGrpSpPr>
+        <p:cNvPr id="1" name=""/>
+        <p:cNvGrpSpPr/>
+        <p:nvPr/>
+      </p:nvGrpSpPr>
+      <p:grpSpPr>
+        <a:xfrm>
+          <a:off x="0" y="0"/>
+          <a:ext cx="0" cy="0"/>
+          <a:chOff x="0" y="0"/>
+          <a:chExt cx="0" cy="0"/>
+        </a:xfrm>
+      </p:grpSpPr>
+      <p:sp>
+        <p:nvSpPr>
+          <p:cNvPr id="2" name="Title 1"/>
+          <p:cNvSpPr>
+            <a:spLocks noGrp="1"/>
+          </p:cNvSpPr>
+          <p:nvPr>
+            <p:ph type="ctrTitle"/>
+          </p:nvPr>
+        </p:nvSpPr>
+        <p:spPr>
+          <a:xfrm>
+            <a:off x="1524000" y="1122363"/>
+            <a:ext cx="9144000" cy="2387600"/>
+          </a:xfrm>
+        </p:spPr>
+        <p:txBody>
+          <a:bodyPr>
+            <a:normAutofit/>
+          </a:bodyPr>
+          <a:lstStyle/>
+          <a:p>
+            <a:r>
+              <a:rPr lang="en-US" sz="4800" dirty="0"/>
+              <a:t>End of Session</a:t>
+            </a:r>
+          </a:p>
+        </p:txBody>
+      </p:sp>
+      <p:sp>
+        <p:nvSpPr>
+          <p:cNvPr id="3" name="Subtitle 2"/>
+          <p:cNvSpPr>
+            <a:spLocks noGrp="1"/>
+          </p:cNvSpPr>
+          <p:nvPr>
+            <p:ph type="subTitle" idx="1"/>
+          </p:nvPr>
+        </p:nvSpPr>
+        <p:spPr>
+          <a:xfrm>
+            <a:off x="1524000" y="3602038"/>
+            <a:ext cx="9144000" cy="2198022"/>
+          </a:xfrm>
+        </p:spPr>
+        <p:txBody>
+          <a:bodyPr>
+            <a:normAutofit/>
+          </a:bodyPr>
+          <a:lstStyle/>
+          <a:p>
+            <a:pPr algn="l"/>
+            <a:r>
+              <a:rPr lang="en-US" dirty="0"/>
+              <a:t>Course Number: CPSC-24700</a:t>
+            </a:r>
+          </a:p>
+          <a:p>
+            <a:pPr algn="l"/>
+            <a:r>
+              <a:rPr lang="en-US" dirty="0"/>
+              <a:t>Instructor: Eric Pogue</a:t>
+            </a:r>
+          </a:p>
+        </p:txBody>
+      </p:sp>
+    </p:spTree>
+    <p:extLst>
+      <p:ext uri="{BB962C8B-B14F-4D97-AF65-F5344CB8AC3E}">
+        <p14:creationId xmlns:p14="http://schemas.microsoft.com/office/powerpoint/2010/main" val="1130818612"/>
+      </p:ext>
+    </p:extLst>
+  </p:cSld>
+  <p:clrMapOvr>
+    <a:masterClrMapping/>
+  </p:clrMapOvr>
+</p:sld>
+</file>
+
 <file path=ppt/slides/slide2.xml><?xml version="1.0" encoding="utf-8"?>
 <p:sld xmlns:a="http://schemas.openxmlformats.org/drawingml/2006/main" xmlns:r="http://schemas.openxmlformats.org/officeDocument/2006/relationships" xmlns:p="http://schemas.openxmlformats.org/presentationml/2006/main">
   <p:cSld>
@@ -4774,105 +4881,155 @@
           <a:chExt cx="0" cy="0"/>
         </a:xfrm>
       </p:grpSpPr>
-      <p:sp>
-        <p:nvSpPr>
-          <p:cNvPr id="4" name="Title 1">
-            <a:extLst>
-              <a:ext uri="{FF2B5EF4-FFF2-40B4-BE49-F238E27FC236}">
-                <a16:creationId xmlns:a16="http://schemas.microsoft.com/office/drawing/2014/main" id="{527CE47F-3EF6-48CA-9239-E8B6E5C6B41A}"/>
-              </a:ext>
-            </a:extLst>
-          </p:cNvPr>
-          <p:cNvSpPr>
-            <a:spLocks noGrp="1"/>
-          </p:cNvSpPr>
-          <p:nvPr>
-            <p:ph type="title"/>
-          </p:nvPr>
-        </p:nvSpPr>
+      <p:pic>
+        <p:nvPicPr>
+          <p:cNvPr id="5" name="Picture 4">
+            <a:extLst>
+              <a:ext uri="{FF2B5EF4-FFF2-40B4-BE49-F238E27FC236}">
+                <a16:creationId xmlns:a16="http://schemas.microsoft.com/office/drawing/2014/main" id="{33528447-B0F0-4B8B-8C5D-C8C2304BA9CD}"/>
+              </a:ext>
+            </a:extLst>
+          </p:cNvPr>
+          <p:cNvPicPr>
+            <a:picLocks noChangeAspect="1"/>
+          </p:cNvPicPr>
+          <p:nvPr/>
+        </p:nvPicPr>
+        <p:blipFill>
+          <a:blip r:embed="rId2">
+            <a:extLst>
+              <a:ext uri="{28A0092B-C50C-407E-A947-70E740481C1C}">
+                <a14:useLocalDpi xmlns:a14="http://schemas.microsoft.com/office/drawing/2010/main" val="0"/>
+              </a:ext>
+            </a:extLst>
+          </a:blip>
+          <a:stretch>
+            <a:fillRect/>
+          </a:stretch>
+        </p:blipFill>
         <p:spPr>
           <a:xfrm>
-            <a:off x="838200" y="365125"/>
-            <a:ext cx="10515600" cy="1325563"/>
+            <a:off x="264868" y="2153181"/>
+            <a:ext cx="3882632" cy="5332976"/>
           </a:xfrm>
+          <a:prstGeom prst="rect">
+            <a:avLst/>
+          </a:prstGeom>
         </p:spPr>
-        <p:txBody>
-          <a:bodyPr>
-            <a:normAutofit/>
-          </a:bodyPr>
-          <a:lstStyle/>
-          <a:p>
-            <a:r>
-              <a:rPr lang="en-US" sz="3600" dirty="0"/>
-              <a:t>Assignment Due Today</a:t>
-            </a:r>
-          </a:p>
-        </p:txBody>
-      </p:sp>
-      <p:sp>
-        <p:nvSpPr>
-          <p:cNvPr id="5" name="Content Placeholder 2">
-            <a:extLst>
-              <a:ext uri="{FF2B5EF4-FFF2-40B4-BE49-F238E27FC236}">
-                <a16:creationId xmlns:a16="http://schemas.microsoft.com/office/drawing/2014/main" id="{E8F0EA9A-219C-40FD-AE36-784EE1B77D56}"/>
-              </a:ext>
-            </a:extLst>
-          </p:cNvPr>
-          <p:cNvSpPr>
-            <a:spLocks noGrp="1"/>
-          </p:cNvSpPr>
-          <p:nvPr>
-            <p:ph idx="1"/>
-          </p:nvPr>
-        </p:nvSpPr>
+      </p:pic>
+      <p:pic>
+        <p:nvPicPr>
+          <p:cNvPr id="9" name="Picture 8">
+            <a:extLst>
+              <a:ext uri="{FF2B5EF4-FFF2-40B4-BE49-F238E27FC236}">
+                <a16:creationId xmlns:a16="http://schemas.microsoft.com/office/drawing/2014/main" id="{76E520AD-750E-455B-B573-54A6F56827A1}"/>
+              </a:ext>
+            </a:extLst>
+          </p:cNvPr>
+          <p:cNvPicPr>
+            <a:picLocks noChangeAspect="1"/>
+          </p:cNvPicPr>
+          <p:nvPr/>
+        </p:nvPicPr>
+        <p:blipFill>
+          <a:blip r:embed="rId3">
+            <a:extLst>
+              <a:ext uri="{28A0092B-C50C-407E-A947-70E740481C1C}">
+                <a14:useLocalDpi xmlns:a14="http://schemas.microsoft.com/office/drawing/2010/main" val="0"/>
+              </a:ext>
+            </a:extLst>
+          </a:blip>
+          <a:stretch>
+            <a:fillRect/>
+          </a:stretch>
+        </p:blipFill>
         <p:spPr>
           <a:xfrm>
-            <a:off x="838198" y="1525772"/>
-            <a:ext cx="10515601" cy="4651191"/>
+            <a:off x="7888949" y="1525204"/>
+            <a:ext cx="3706138" cy="5795606"/>
           </a:xfrm>
+          <a:prstGeom prst="rect">
+            <a:avLst/>
+          </a:prstGeom>
         </p:spPr>
-        <p:txBody>
-          <a:bodyPr>
-            <a:normAutofit/>
+      </p:pic>
+      <p:pic>
+        <p:nvPicPr>
+          <p:cNvPr id="7" name="Picture 6">
+            <a:extLst>
+              <a:ext uri="{FF2B5EF4-FFF2-40B4-BE49-F238E27FC236}">
+                <a16:creationId xmlns:a16="http://schemas.microsoft.com/office/drawing/2014/main" id="{A22FC799-D6F5-486B-9AAA-A6131B337F13}"/>
+              </a:ext>
+            </a:extLst>
+          </p:cNvPr>
+          <p:cNvPicPr>
+            <a:picLocks noChangeAspect="1"/>
+          </p:cNvPicPr>
+          <p:nvPr/>
+        </p:nvPicPr>
+        <p:blipFill>
+          <a:blip r:embed="rId4">
+            <a:extLst>
+              <a:ext uri="{28A0092B-C50C-407E-A947-70E740481C1C}">
+                <a14:useLocalDpi xmlns:a14="http://schemas.microsoft.com/office/drawing/2010/main" val="0"/>
+              </a:ext>
+            </a:extLst>
+          </a:blip>
+          <a:stretch>
+            <a:fillRect/>
+          </a:stretch>
+        </p:blipFill>
+        <p:spPr>
+          <a:xfrm>
+            <a:off x="3863601" y="71510"/>
+            <a:ext cx="4025348" cy="6858000"/>
+          </a:xfrm>
+          <a:prstGeom prst="rect">
+            <a:avLst/>
+          </a:prstGeom>
+        </p:spPr>
+      </p:pic>
+      <p:sp>
+        <p:nvSpPr>
+          <p:cNvPr id="10" name="TextBox 9">
+            <a:extLst>
+              <a:ext uri="{FF2B5EF4-FFF2-40B4-BE49-F238E27FC236}">
+                <a16:creationId xmlns:a16="http://schemas.microsoft.com/office/drawing/2014/main" id="{54D1AF38-F9BD-4447-9A37-7EB47DB9B1B4}"/>
+              </a:ext>
+            </a:extLst>
+          </p:cNvPr>
+          <p:cNvSpPr txBox="1"/>
+          <p:nvPr/>
+        </p:nvSpPr>
+        <p:spPr>
+          <a:xfrm>
+            <a:off x="563481" y="539012"/>
+            <a:ext cx="2016899" cy="830997"/>
+          </a:xfrm>
+          <a:prstGeom prst="rect">
+            <a:avLst/>
+          </a:prstGeom>
+          <a:noFill/>
+        </p:spPr>
+        <p:txBody>
+          <a:bodyPr wrap="none" rtlCol="0">
+            <a:spAutoFit/>
           </a:bodyPr>
           <a:lstStyle/>
           <a:p>
-            <a:pPr marL="0" indent="0">
-              <a:spcBef>
-                <a:spcPts val="4800"/>
-              </a:spcBef>
-              <a:buNone/>
-            </a:pPr>
-            <a:r>
-              <a:rPr lang="en-US" sz="2000" u="sng" dirty="0"/>
-              <a:t>Assignment:</a:t>
-            </a:r>
-          </a:p>
-          <a:p>
-            <a:r>
-              <a:rPr lang="en-US" sz="2000" dirty="0"/>
-              <a:t>Ch.1.6 through 2.7</a:t>
-            </a:r>
-          </a:p>
-          <a:p>
-            <a:r>
-              <a:rPr lang="en-US" sz="2000" dirty="0"/>
-              <a:t>Lab Preparation… review a HTML5 Hello World implementation from the Web </a:t>
-            </a:r>
-            <a:r>
-              <a:rPr lang="en-US" sz="2000" dirty="0">
-                <a:hlinkClick r:id="rId3"/>
+            <a:r>
+              <a:rPr lang="en-US" sz="4800" i="1" u="sng" dirty="0">
+                <a:latin typeface="Berlin Sans FB" panose="020E0602020502020306" pitchFamily="34" charset="0"/>
               </a:rPr>
-              <a:t>[link]</a:t>
-            </a:r>
-            <a:endParaRPr lang="en-US" sz="2000" dirty="0"/>
+              <a:t>Amelia</a:t>
+            </a:r>
           </a:p>
         </p:txBody>
       </p:sp>
     </p:spTree>
     <p:extLst>
       <p:ext uri="{BB962C8B-B14F-4D97-AF65-F5344CB8AC3E}">
-        <p14:creationId xmlns:p14="http://schemas.microsoft.com/office/powerpoint/2010/main" val="1478976984"/>
+        <p14:creationId xmlns:p14="http://schemas.microsoft.com/office/powerpoint/2010/main" val="2156152466"/>
       </p:ext>
     </p:extLst>
   </p:cSld>
@@ -4901,6 +5058,131 @@
       </p:grpSpPr>
       <p:sp>
         <p:nvSpPr>
+          <p:cNvPr id="4" name="Title 1">
+            <a:extLst>
+              <a:ext uri="{FF2B5EF4-FFF2-40B4-BE49-F238E27FC236}">
+                <a16:creationId xmlns:a16="http://schemas.microsoft.com/office/drawing/2014/main" id="{527CE47F-3EF6-48CA-9239-E8B6E5C6B41A}"/>
+              </a:ext>
+            </a:extLst>
+          </p:cNvPr>
+          <p:cNvSpPr>
+            <a:spLocks noGrp="1"/>
+          </p:cNvSpPr>
+          <p:nvPr>
+            <p:ph type="title"/>
+          </p:nvPr>
+        </p:nvSpPr>
+        <p:spPr>
+          <a:xfrm>
+            <a:off x="838200" y="365125"/>
+            <a:ext cx="10515600" cy="1325563"/>
+          </a:xfrm>
+        </p:spPr>
+        <p:txBody>
+          <a:bodyPr>
+            <a:normAutofit/>
+          </a:bodyPr>
+          <a:lstStyle/>
+          <a:p>
+            <a:r>
+              <a:rPr lang="en-US" sz="3600" dirty="0"/>
+              <a:t>Assignment Due Today</a:t>
+            </a:r>
+          </a:p>
+        </p:txBody>
+      </p:sp>
+      <p:sp>
+        <p:nvSpPr>
+          <p:cNvPr id="5" name="Content Placeholder 2">
+            <a:extLst>
+              <a:ext uri="{FF2B5EF4-FFF2-40B4-BE49-F238E27FC236}">
+                <a16:creationId xmlns:a16="http://schemas.microsoft.com/office/drawing/2014/main" id="{E8F0EA9A-219C-40FD-AE36-784EE1B77D56}"/>
+              </a:ext>
+            </a:extLst>
+          </p:cNvPr>
+          <p:cNvSpPr>
+            <a:spLocks noGrp="1"/>
+          </p:cNvSpPr>
+          <p:nvPr>
+            <p:ph idx="1"/>
+          </p:nvPr>
+        </p:nvSpPr>
+        <p:spPr>
+          <a:xfrm>
+            <a:off x="838198" y="1525772"/>
+            <a:ext cx="10515601" cy="4651191"/>
+          </a:xfrm>
+        </p:spPr>
+        <p:txBody>
+          <a:bodyPr>
+            <a:normAutofit/>
+          </a:bodyPr>
+          <a:lstStyle/>
+          <a:p>
+            <a:pPr marL="0" indent="0">
+              <a:spcBef>
+                <a:spcPts val="4800"/>
+              </a:spcBef>
+              <a:buNone/>
+            </a:pPr>
+            <a:r>
+              <a:rPr lang="en-US" sz="2000" u="sng" dirty="0"/>
+              <a:t>Assignment:</a:t>
+            </a:r>
+          </a:p>
+          <a:p>
+            <a:r>
+              <a:rPr lang="en-US" sz="2000" dirty="0"/>
+              <a:t>Ch.1.6 through 2.7</a:t>
+            </a:r>
+          </a:p>
+          <a:p>
+            <a:r>
+              <a:rPr lang="en-US" sz="2000" dirty="0"/>
+              <a:t>Lab Preparation… review a HTML5 Hello World implementation from the Web </a:t>
+            </a:r>
+            <a:r>
+              <a:rPr lang="en-US" sz="2000" dirty="0">
+                <a:hlinkClick r:id="rId3"/>
+              </a:rPr>
+              <a:t>[link]</a:t>
+            </a:r>
+            <a:endParaRPr lang="en-US" sz="2000" dirty="0"/>
+          </a:p>
+        </p:txBody>
+      </p:sp>
+    </p:spTree>
+    <p:extLst>
+      <p:ext uri="{BB962C8B-B14F-4D97-AF65-F5344CB8AC3E}">
+        <p14:creationId xmlns:p14="http://schemas.microsoft.com/office/powerpoint/2010/main" val="1478976984"/>
+      </p:ext>
+    </p:extLst>
+  </p:cSld>
+  <p:clrMapOvr>
+    <a:masterClrMapping/>
+  </p:clrMapOvr>
+</p:sld>
+</file>
+
+<file path=ppt/slides/slide4.xml><?xml version="1.0" encoding="utf-8"?>
+<p:sld xmlns:a="http://schemas.openxmlformats.org/drawingml/2006/main" xmlns:r="http://schemas.openxmlformats.org/officeDocument/2006/relationships" xmlns:p="http://schemas.openxmlformats.org/presentationml/2006/main">
+  <p:cSld>
+    <p:spTree>
+      <p:nvGrpSpPr>
+        <p:cNvPr id="1" name=""/>
+        <p:cNvGrpSpPr/>
+        <p:nvPr/>
+      </p:nvGrpSpPr>
+      <p:grpSpPr>
+        <a:xfrm>
+          <a:off x="0" y="0"/>
+          <a:ext cx="0" cy="0"/>
+          <a:chOff x="0" y="0"/>
+          <a:chExt cx="0" cy="0"/>
+        </a:xfrm>
+      </p:grpSpPr>
+      <p:sp>
+        <p:nvSpPr>
           <p:cNvPr id="2" name="Title 1"/>
           <p:cNvSpPr>
             <a:spLocks noGrp="1"/>
@@ -4948,7 +5230,7 @@
 </p:sld>
 </file>
 
-<file path=ppt/slides/slide4.xml><?xml version="1.0" encoding="utf-8"?>
+<file path=ppt/slides/slide5.xml><?xml version="1.0" encoding="utf-8"?>
 <p:sld xmlns:a="http://schemas.openxmlformats.org/drawingml/2006/main" xmlns:r="http://schemas.openxmlformats.org/officeDocument/2006/relationships" xmlns:p="http://schemas.openxmlformats.org/presentationml/2006/main">
   <p:cSld>
     <p:spTree>
@@ -5204,281 +5486,6 @@
 </p:sld>
 </file>
 
-<file path=ppt/slides/slide5.xml><?xml version="1.0" encoding="utf-8"?>
-<p:sld xmlns:a="http://schemas.openxmlformats.org/drawingml/2006/main" xmlns:r="http://schemas.openxmlformats.org/officeDocument/2006/relationships" xmlns:p="http://schemas.openxmlformats.org/presentationml/2006/main">
-  <p:cSld>
-    <p:spTree>
-      <p:nvGrpSpPr>
-        <p:cNvPr id="1" name=""/>
-        <p:cNvGrpSpPr/>
-        <p:nvPr/>
-      </p:nvGrpSpPr>
-      <p:grpSpPr>
-        <a:xfrm>
-          <a:off x="0" y="0"/>
-          <a:ext cx="0" cy="0"/>
-          <a:chOff x="0" y="0"/>
-          <a:chExt cx="0" cy="0"/>
-        </a:xfrm>
-      </p:grpSpPr>
-      <p:sp>
-        <p:nvSpPr>
-          <p:cNvPr id="4" name="Title 1">
-            <a:extLst>
-              <a:ext uri="{FF2B5EF4-FFF2-40B4-BE49-F238E27FC236}">
-                <a16:creationId xmlns:a16="http://schemas.microsoft.com/office/drawing/2014/main" id="{BB378CBF-14ED-418D-866F-83F08A1394FB}"/>
-              </a:ext>
-            </a:extLst>
-          </p:cNvPr>
-          <p:cNvSpPr>
-            <a:spLocks noGrp="1"/>
-          </p:cNvSpPr>
-          <p:nvPr>
-            <p:ph type="title"/>
-          </p:nvPr>
-        </p:nvSpPr>
-        <p:spPr>
-          <a:xfrm>
-            <a:off x="838200" y="474626"/>
-            <a:ext cx="10515600" cy="757272"/>
-          </a:xfrm>
-        </p:spPr>
-        <p:txBody>
-          <a:bodyPr>
-            <a:normAutofit/>
-          </a:bodyPr>
-          <a:lstStyle/>
-          <a:p>
-            <a:r>
-              <a:rPr lang="en-US" sz="3600" dirty="0"/>
-              <a:t>Lab: “Hello World – HTML! EJP”</a:t>
-            </a:r>
-            <a:endParaRPr lang="en-US" sz="3600" b="1" i="1" u="sng" dirty="0"/>
-          </a:p>
-        </p:txBody>
-      </p:sp>
-      <p:sp>
-        <p:nvSpPr>
-          <p:cNvPr id="5" name="Content Placeholder 2">
-            <a:extLst>
-              <a:ext uri="{FF2B5EF4-FFF2-40B4-BE49-F238E27FC236}">
-                <a16:creationId xmlns:a16="http://schemas.microsoft.com/office/drawing/2014/main" id="{727BBDCE-1802-4E01-83C0-A3AA3610FD4D}"/>
-              </a:ext>
-            </a:extLst>
-          </p:cNvPr>
-          <p:cNvSpPr>
-            <a:spLocks noGrp="1"/>
-          </p:cNvSpPr>
-          <p:nvPr>
-            <p:ph idx="1"/>
-          </p:nvPr>
-        </p:nvSpPr>
-        <p:spPr>
-          <a:xfrm>
-            <a:off x="838200" y="1231898"/>
-            <a:ext cx="10718950" cy="5672555"/>
-          </a:xfrm>
-        </p:spPr>
-        <p:txBody>
-          <a:bodyPr>
-            <a:normAutofit/>
-          </a:bodyPr>
-          <a:lstStyle/>
-          <a:p>
-            <a:pPr marL="457200" indent="-457200">
-              <a:buFont typeface="+mj-lt"/>
-              <a:buAutoNum type="arabicPeriod"/>
-            </a:pPr>
-            <a:r>
-              <a:rPr lang="en-US" sz="2000" dirty="0"/>
-              <a:t>Log into your computer</a:t>
-            </a:r>
-          </a:p>
-          <a:p>
-            <a:pPr marL="457200" indent="-457200">
-              <a:buFont typeface="+mj-lt"/>
-              <a:buAutoNum type="arabicPeriod"/>
-            </a:pPr>
-            <a:r>
-              <a:rPr lang="en-US" sz="2000" dirty="0"/>
-              <a:t>Open your favorite text editor</a:t>
-            </a:r>
-          </a:p>
-          <a:p>
-            <a:pPr marL="457200" indent="-457200">
-              <a:buFont typeface="+mj-lt"/>
-              <a:buAutoNum type="arabicPeriod"/>
-            </a:pPr>
-            <a:r>
-              <a:rPr lang="en-US" sz="2000" dirty="0"/>
-              <a:t>Review HTML5 Hello World implementation from the Web </a:t>
-            </a:r>
-            <a:r>
-              <a:rPr lang="en-US" sz="2000" dirty="0">
-                <a:hlinkClick r:id="rId3"/>
-              </a:rPr>
-              <a:t>[link]</a:t>
-            </a:r>
-            <a:endParaRPr lang="en-US" sz="2000" dirty="0"/>
-          </a:p>
-          <a:p>
-            <a:pPr marL="457200" indent="-457200">
-              <a:buFont typeface="+mj-lt"/>
-              <a:buAutoNum type="arabicPeriod"/>
-            </a:pPr>
-            <a:r>
-              <a:rPr lang="en-US" sz="2000" dirty="0"/>
-              <a:t>Type in your own “Hello World – HTML! [your initials]”… Please be specific*</a:t>
-            </a:r>
-          </a:p>
-          <a:p>
-            <a:pPr lvl="1"/>
-            <a:r>
-              <a:rPr lang="en-US" sz="1600" dirty="0"/>
-              <a:t>Type in your initials and not ‘[your initials]’</a:t>
-            </a:r>
-          </a:p>
-          <a:p>
-            <a:pPr lvl="1"/>
-            <a:r>
-              <a:rPr lang="en-US" sz="1600" dirty="0"/>
-              <a:t>For “Hello World – HTML!” </a:t>
-            </a:r>
-          </a:p>
-          <a:p>
-            <a:pPr lvl="1"/>
-            <a:r>
-              <a:rPr lang="en-US" sz="1600" dirty="0"/>
-              <a:t>Utilize an </a:t>
-            </a:r>
-            <a:r>
-              <a:rPr lang="en-US" sz="1600" dirty="0" err="1"/>
-              <a:t>em</a:t>
-            </a:r>
-            <a:r>
-              <a:rPr lang="en-US" sz="1600" dirty="0"/>
-              <a:t> dash ‘–’ in your HTML5/UTF-8 code </a:t>
-            </a:r>
-            <a:r>
-              <a:rPr lang="en-US" sz="1600" dirty="0">
-                <a:hlinkClick r:id="rId4"/>
-              </a:rPr>
-              <a:t>[link]</a:t>
-            </a:r>
-            <a:endParaRPr lang="en-US" sz="1600" dirty="0"/>
-          </a:p>
-          <a:p>
-            <a:pPr lvl="1"/>
-            <a:r>
-              <a:rPr lang="en-US" sz="1600" dirty="0"/>
-              <a:t>Do you really understand the difference between ANSI and UTF-8? </a:t>
-            </a:r>
-            <a:r>
-              <a:rPr lang="en-US" sz="1600" dirty="0">
-                <a:hlinkClick r:id="rId5"/>
-              </a:rPr>
-              <a:t>[link]</a:t>
-            </a:r>
-            <a:endParaRPr lang="en-US" sz="1600" dirty="0"/>
-          </a:p>
-          <a:p>
-            <a:pPr lvl="1"/>
-            <a:r>
-              <a:rPr lang="en-US" sz="1600" dirty="0"/>
-              <a:t>Utilize one space after punctuation marks like periods and exclamation points </a:t>
-            </a:r>
-            <a:r>
-              <a:rPr lang="en-US" sz="1600" dirty="0">
-                <a:hlinkClick r:id="rId6"/>
-              </a:rPr>
-              <a:t>[link]</a:t>
-            </a:r>
-            <a:endParaRPr lang="en-US" sz="1600" dirty="0"/>
-          </a:p>
-          <a:p>
-            <a:pPr marL="457200" indent="-457200">
-              <a:buFont typeface="+mj-lt"/>
-              <a:buAutoNum type="arabicPeriod"/>
-            </a:pPr>
-            <a:r>
-              <a:rPr lang="en-US" sz="2000" dirty="0"/>
-              <a:t>Save your file as a HTML utilizing dash-separated naming</a:t>
-            </a:r>
-          </a:p>
-          <a:p>
-            <a:pPr lvl="1"/>
-            <a:r>
-              <a:rPr lang="en-US" sz="1600" dirty="0"/>
-              <a:t>‘hello-world-ejp.html’… please use your own initials</a:t>
-            </a:r>
-          </a:p>
-          <a:p>
-            <a:pPr lvl="1"/>
-            <a:r>
-              <a:rPr lang="en-US" sz="1600" dirty="0"/>
-              <a:t>Recall why we do </a:t>
-            </a:r>
-            <a:r>
-              <a:rPr lang="en-US" sz="1600" u="sng" dirty="0"/>
-              <a:t>not</a:t>
-            </a:r>
-            <a:r>
-              <a:rPr lang="en-US" sz="1600" dirty="0"/>
-              <a:t> want to utilize spaces in our file names </a:t>
-            </a:r>
-            <a:r>
-              <a:rPr lang="en-US" sz="1600" dirty="0">
-                <a:hlinkClick r:id="rId7"/>
-              </a:rPr>
-              <a:t>[link]</a:t>
-            </a:r>
-            <a:endParaRPr lang="en-US" sz="1600" dirty="0"/>
-          </a:p>
-          <a:p>
-            <a:pPr marL="457200" indent="-457200">
-              <a:buFont typeface="+mj-lt"/>
-              <a:buAutoNum type="arabicPeriod"/>
-            </a:pPr>
-            <a:r>
-              <a:rPr lang="en-US" sz="2000" dirty="0"/>
-              <a:t>Now launch your Web Browser and open the file you have just saved</a:t>
-            </a:r>
-          </a:p>
-          <a:p>
-            <a:pPr marL="457200" indent="-457200">
-              <a:buFont typeface="+mj-lt"/>
-              <a:buAutoNum type="arabicPeriod"/>
-            </a:pPr>
-            <a:r>
-              <a:rPr lang="en-US" sz="2000" dirty="0"/>
-              <a:t>Save this file to a safe place where you will be able to find it later… how will you choose to name your folders?</a:t>
-            </a:r>
-          </a:p>
-          <a:p>
-            <a:pPr marL="457200" indent="-457200">
-              <a:buFont typeface="+mj-lt"/>
-              <a:buAutoNum type="arabicPeriod"/>
-            </a:pPr>
-            <a:r>
-              <a:rPr lang="en-US" sz="2000" strike="sngStrike" dirty="0"/>
-              <a:t>Submit the file through Blackboard</a:t>
-            </a:r>
-          </a:p>
-        </p:txBody>
-      </p:sp>
-    </p:spTree>
-    <p:extLst>
-      <p:ext uri="{BB962C8B-B14F-4D97-AF65-F5344CB8AC3E}">
-        <p14:creationId xmlns:p14="http://schemas.microsoft.com/office/powerpoint/2010/main" val="2968605876"/>
-      </p:ext>
-    </p:extLst>
-  </p:cSld>
-  <p:clrMapOvr>
-    <a:masterClrMapping/>
-  </p:clrMapOvr>
-</p:sld>
-</file>
-
 <file path=ppt/slides/slide6.xml><?xml version="1.0" encoding="utf-8"?>
 <p:sld xmlns:a="http://schemas.openxmlformats.org/drawingml/2006/main" xmlns:r="http://schemas.openxmlformats.org/officeDocument/2006/relationships" xmlns:p="http://schemas.openxmlformats.org/presentationml/2006/main">
   <p:cSld>
@@ -5501,7 +5508,7 @@
           <p:cNvPr id="4" name="Title 1">
             <a:extLst>
               <a:ext uri="{FF2B5EF4-FFF2-40B4-BE49-F238E27FC236}">
-                <a16:creationId xmlns:a16="http://schemas.microsoft.com/office/drawing/2014/main" id="{527CE47F-3EF6-48CA-9239-E8B6E5C6B41A}"/>
+                <a16:creationId xmlns:a16="http://schemas.microsoft.com/office/drawing/2014/main" id="{BB378CBF-14ED-418D-866F-83F08A1394FB}"/>
               </a:ext>
             </a:extLst>
           </p:cNvPr>
@@ -5514,8 +5521,8 @@
         </p:nvSpPr>
         <p:spPr>
           <a:xfrm>
-            <a:off x="838200" y="365125"/>
-            <a:ext cx="10515600" cy="1325563"/>
+            <a:off x="838200" y="474626"/>
+            <a:ext cx="10515600" cy="757272"/>
           </a:xfrm>
         </p:spPr>
         <p:txBody>
@@ -5526,8 +5533,9 @@
           <a:p>
             <a:r>
               <a:rPr lang="en-US" sz="3600" dirty="0"/>
-              <a:t>Assignment for Friday</a:t>
-            </a:r>
+              <a:t>Lab: “Hello World – HTML! EJP”</a:t>
+            </a:r>
+            <a:endParaRPr lang="en-US" sz="3600" b="1" i="1" u="sng" dirty="0"/>
           </a:p>
         </p:txBody>
       </p:sp>
@@ -5536,7 +5544,7 @@
           <p:cNvPr id="5" name="Content Placeholder 2">
             <a:extLst>
               <a:ext uri="{FF2B5EF4-FFF2-40B4-BE49-F238E27FC236}">
-                <a16:creationId xmlns:a16="http://schemas.microsoft.com/office/drawing/2014/main" id="{E8F0EA9A-219C-40FD-AE36-784EE1B77D56}"/>
+                <a16:creationId xmlns:a16="http://schemas.microsoft.com/office/drawing/2014/main" id="{727BBDCE-1802-4E01-83C0-A3AA3610FD4D}"/>
               </a:ext>
             </a:extLst>
           </p:cNvPr>
@@ -5549,8 +5557,8 @@
         </p:nvSpPr>
         <p:spPr>
           <a:xfrm>
-            <a:off x="838198" y="1525772"/>
-            <a:ext cx="10515601" cy="4651191"/>
+            <a:off x="838200" y="1231898"/>
+            <a:ext cx="10718950" cy="5672555"/>
           </a:xfrm>
         </p:spPr>
         <p:txBody>
@@ -5559,21 +5567,183 @@
           </a:bodyPr>
           <a:lstStyle/>
           <a:p>
-            <a:pPr marL="0" indent="0">
-              <a:spcBef>
-                <a:spcPts val="4800"/>
-              </a:spcBef>
-              <a:buNone/>
+            <a:pPr marL="457200" indent="-457200">
+              <a:buFont typeface="+mj-lt"/>
+              <a:buAutoNum type="arabicPeriod"/>
             </a:pPr>
             <a:r>
-              <a:rPr lang="en-US" sz="2000" u="sng" dirty="0"/>
-              <a:t>Assignment (before next class):</a:t>
-            </a:r>
-          </a:p>
-          <a:p>
-            <a:r>
               <a:rPr lang="en-US" sz="2000" dirty="0"/>
-              <a:t>Review &amp; Start Working on Project 1… it is due in two weeks</a:t>
+              <a:t>Log into your computer</a:t>
+            </a:r>
+          </a:p>
+          <a:p>
+            <a:pPr marL="457200" indent="-457200">
+              <a:buFont typeface="+mj-lt"/>
+              <a:buAutoNum type="arabicPeriod"/>
+            </a:pPr>
+            <a:r>
+              <a:rPr lang="en-US" sz="2000" dirty="0"/>
+              <a:t>Open your favorite text editor</a:t>
+            </a:r>
+          </a:p>
+          <a:p>
+            <a:pPr marL="457200" indent="-457200">
+              <a:buFont typeface="+mj-lt"/>
+              <a:buAutoNum type="arabicPeriod"/>
+            </a:pPr>
+            <a:r>
+              <a:rPr lang="en-US" sz="2000" dirty="0"/>
+              <a:t>Review HTML5 Hello World implementation from the Web </a:t>
+            </a:r>
+            <a:r>
+              <a:rPr lang="en-US" sz="2000" dirty="0">
+                <a:hlinkClick r:id="rId3"/>
+              </a:rPr>
+              <a:t>[link]</a:t>
+            </a:r>
+            <a:endParaRPr lang="en-US" sz="2000" dirty="0"/>
+          </a:p>
+          <a:p>
+            <a:pPr marL="457200" indent="-457200">
+              <a:buFont typeface="+mj-lt"/>
+              <a:buAutoNum type="arabicPeriod"/>
+            </a:pPr>
+            <a:r>
+              <a:rPr lang="en-US" sz="2000" dirty="0"/>
+              <a:t>Type in your own “Hello World – HTML! [your initials]”… Please be specific*</a:t>
+            </a:r>
+          </a:p>
+          <a:p>
+            <a:pPr lvl="1"/>
+            <a:r>
+              <a:rPr lang="en-US" sz="1600" dirty="0"/>
+              <a:t>Type in your initials and not ‘[your initials]’</a:t>
+            </a:r>
+          </a:p>
+          <a:p>
+            <a:pPr lvl="1"/>
+            <a:r>
+              <a:rPr lang="en-US" sz="1600" dirty="0"/>
+              <a:t>For “Hello World – HTML!” </a:t>
+            </a:r>
+          </a:p>
+          <a:p>
+            <a:pPr lvl="1"/>
+            <a:r>
+              <a:rPr lang="en-US" sz="1600" dirty="0"/>
+              <a:t>Utilize an </a:t>
+            </a:r>
+            <a:r>
+              <a:rPr lang="en-US" sz="1600" dirty="0" err="1"/>
+              <a:t>em</a:t>
+            </a:r>
+            <a:r>
+              <a:rPr lang="en-US" sz="1600" dirty="0"/>
+              <a:t> dash ‘–’ in your HTML5/UTF-8 code </a:t>
+            </a:r>
+            <a:r>
+              <a:rPr lang="en-US" sz="1600" dirty="0">
+                <a:hlinkClick r:id="rId4"/>
+              </a:rPr>
+              <a:t>[link]</a:t>
+            </a:r>
+            <a:endParaRPr lang="en-US" sz="1600" dirty="0"/>
+          </a:p>
+          <a:p>
+            <a:pPr lvl="1"/>
+            <a:r>
+              <a:rPr lang="en-US" sz="1600" dirty="0"/>
+              <a:t>Do you really understand the difference between ANSI and UTF-8? </a:t>
+            </a:r>
+            <a:r>
+              <a:rPr lang="en-US" sz="1600" dirty="0">
+                <a:hlinkClick r:id="rId5"/>
+              </a:rPr>
+              <a:t>[link]</a:t>
+            </a:r>
+            <a:endParaRPr lang="en-US" sz="1600" dirty="0"/>
+          </a:p>
+          <a:p>
+            <a:pPr lvl="1"/>
+            <a:r>
+              <a:rPr lang="en-US" sz="1600" dirty="0"/>
+              <a:t>Utilize one space after punctuation marks like periods and exclamation points </a:t>
+            </a:r>
+            <a:r>
+              <a:rPr lang="en-US" sz="1600" dirty="0">
+                <a:hlinkClick r:id="rId6"/>
+              </a:rPr>
+              <a:t>[link]</a:t>
+            </a:r>
+            <a:endParaRPr lang="en-US" sz="1600" dirty="0"/>
+          </a:p>
+          <a:p>
+            <a:pPr marL="457200" indent="-457200">
+              <a:buFont typeface="+mj-lt"/>
+              <a:buAutoNum type="arabicPeriod"/>
+            </a:pPr>
+            <a:r>
+              <a:rPr lang="en-US" sz="2000" dirty="0"/>
+              <a:t>Save your file as a HTML utilizing dash-separated naming</a:t>
+            </a:r>
+          </a:p>
+          <a:p>
+            <a:pPr lvl="1"/>
+            <a:r>
+              <a:rPr lang="en-US" sz="1600" dirty="0"/>
+              <a:t>‘hello-world-ejp.html’… please use your own initials</a:t>
+            </a:r>
+          </a:p>
+          <a:p>
+            <a:pPr lvl="1"/>
+            <a:r>
+              <a:rPr lang="en-US" sz="1600" dirty="0"/>
+              <a:t>Recall why we do </a:t>
+            </a:r>
+            <a:r>
+              <a:rPr lang="en-US" sz="1600" u="sng" dirty="0"/>
+              <a:t>not</a:t>
+            </a:r>
+            <a:r>
+              <a:rPr lang="en-US" sz="1600" dirty="0"/>
+              <a:t> want to utilize spaces in our file names </a:t>
+            </a:r>
+            <a:r>
+              <a:rPr lang="en-US" sz="1600" dirty="0">
+                <a:hlinkClick r:id="rId7"/>
+              </a:rPr>
+              <a:t>[link]</a:t>
+            </a:r>
+            <a:endParaRPr lang="en-US" sz="1600" dirty="0"/>
+          </a:p>
+          <a:p>
+            <a:pPr marL="457200" indent="-457200">
+              <a:buFont typeface="+mj-lt"/>
+              <a:buAutoNum type="arabicPeriod"/>
+            </a:pPr>
+            <a:r>
+              <a:rPr lang="en-US" sz="2000" dirty="0"/>
+              <a:t>Now launch your Web Browser and open the file you have just saved</a:t>
+            </a:r>
+          </a:p>
+          <a:p>
+            <a:pPr marL="457200" indent="-457200">
+              <a:buFont typeface="+mj-lt"/>
+              <a:buAutoNum type="arabicPeriod"/>
+            </a:pPr>
+            <a:r>
+              <a:rPr lang="en-US" sz="2000" dirty="0"/>
+              <a:t>Save this file to a safe place where you will be able to find it later… how will you choose to name your folders?</a:t>
+            </a:r>
+          </a:p>
+          <a:p>
+            <a:pPr marL="457200" indent="-457200">
+              <a:buFont typeface="+mj-lt"/>
+              <a:buAutoNum type="arabicPeriod"/>
+            </a:pPr>
+            <a:r>
+              <a:rPr lang="en-US" sz="2000" strike="sngStrike" dirty="0"/>
+              <a:t>Submit the file through Blackboard</a:t>
             </a:r>
           </a:p>
         </p:txBody>
@@ -5581,7 +5751,7 @@
     </p:spTree>
     <p:extLst>
       <p:ext uri="{BB962C8B-B14F-4D97-AF65-F5344CB8AC3E}">
-        <p14:creationId xmlns:p14="http://schemas.microsoft.com/office/powerpoint/2010/main" val="581885093"/>
+        <p14:creationId xmlns:p14="http://schemas.microsoft.com/office/powerpoint/2010/main" val="2968605876"/>
       </p:ext>
     </p:extLst>
   </p:cSld>
@@ -5638,7 +5808,7 @@
           <a:p>
             <a:r>
               <a:rPr lang="en-US" sz="3600" dirty="0"/>
-              <a:t>Wrap-up</a:t>
+              <a:t>Assignment for Friday</a:t>
             </a:r>
           </a:p>
         </p:txBody>
@@ -5672,80 +5842,20 @@
           <a:lstStyle/>
           <a:p>
             <a:pPr marL="0" indent="0">
+              <a:spcBef>
+                <a:spcPts val="4800"/>
+              </a:spcBef>
               <a:buNone/>
             </a:pPr>
             <a:r>
               <a:rPr lang="en-US" sz="2000" u="sng" dirty="0"/>
-              <a:t>Wrap-up: </a:t>
-            </a:r>
-          </a:p>
-          <a:p>
-            <a:pPr marL="0" indent="0">
-              <a:spcBef>
-                <a:spcPts val="1800"/>
-              </a:spcBef>
-              <a:buNone/>
-            </a:pPr>
+              <a:t>Assignment (before next class):</a:t>
+            </a:r>
+          </a:p>
+          <a:p>
             <a:r>
               <a:rPr lang="en-US" sz="2000" dirty="0"/>
-              <a:t>Quiz 1 is due next Wednesday</a:t>
-            </a:r>
-          </a:p>
-          <a:p>
-            <a:pPr>
-              <a:spcBef>
-                <a:spcPts val="0"/>
-              </a:spcBef>
-            </a:pPr>
-            <a:r>
-              <a:rPr lang="en-US" sz="2000" dirty="0"/>
-              <a:t>You can take it up to three times</a:t>
-            </a:r>
-          </a:p>
-          <a:p>
-            <a:pPr>
-              <a:spcBef>
-                <a:spcPts val="0"/>
-              </a:spcBef>
-            </a:pPr>
-            <a:r>
-              <a:rPr lang="en-US" sz="2000" dirty="0"/>
-              <a:t>The best score out of the three will be taken</a:t>
-            </a:r>
-          </a:p>
-          <a:p>
-            <a:pPr>
-              <a:spcBef>
-                <a:spcPts val="0"/>
-              </a:spcBef>
-            </a:pPr>
-            <a:r>
-              <a:rPr lang="en-US" sz="2000" dirty="0"/>
-              <a:t>I would  suggest taking it the first time early so that you can get more out of your study/lecture</a:t>
-            </a:r>
-          </a:p>
-          <a:p>
-            <a:pPr marL="0" indent="0">
-              <a:spcBef>
-                <a:spcPts val="1800"/>
-              </a:spcBef>
-              <a:buNone/>
-            </a:pPr>
-            <a:r>
-              <a:rPr lang="en-US" sz="2000" dirty="0"/>
-              <a:t>I’m looking for a volunteer (or two) to look at Project 2 setting up a  Website on Azure</a:t>
-            </a:r>
-          </a:p>
-          <a:p>
-            <a:pPr marL="0" indent="0">
-              <a:spcBef>
-                <a:spcPts val="1800"/>
-              </a:spcBef>
-              <a:buNone/>
-            </a:pPr>
-            <a:r>
-              <a:rPr lang="en-US" sz="2000" dirty="0"/>
-              <a:t>How did the video work out? </a:t>
+              <a:t>Review &amp; Start Working on Project 1… it is due in two weeks</a:t>
             </a:r>
           </a:p>
         </p:txBody>
@@ -5753,7 +5863,7 @@
     </p:spTree>
     <p:extLst>
       <p:ext uri="{BB962C8B-B14F-4D97-AF65-F5344CB8AC3E}">
-        <p14:creationId xmlns:p14="http://schemas.microsoft.com/office/powerpoint/2010/main" val="2036264509"/>
+        <p14:creationId xmlns:p14="http://schemas.microsoft.com/office/powerpoint/2010/main" val="581885093"/>
       </p:ext>
     </p:extLst>
   </p:cSld>
@@ -5782,18 +5892,24 @@
       </p:grpSpPr>
       <p:sp>
         <p:nvSpPr>
-          <p:cNvPr id="2" name="Title 1"/>
-          <p:cNvSpPr>
-            <a:spLocks noGrp="1"/>
-          </p:cNvSpPr>
-          <p:nvPr>
-            <p:ph type="ctrTitle"/>
+          <p:cNvPr id="4" name="Title 1">
+            <a:extLst>
+              <a:ext uri="{FF2B5EF4-FFF2-40B4-BE49-F238E27FC236}">
+                <a16:creationId xmlns:a16="http://schemas.microsoft.com/office/drawing/2014/main" id="{527CE47F-3EF6-48CA-9239-E8B6E5C6B41A}"/>
+              </a:ext>
+            </a:extLst>
+          </p:cNvPr>
+          <p:cNvSpPr>
+            <a:spLocks noGrp="1"/>
+          </p:cNvSpPr>
+          <p:nvPr>
+            <p:ph type="title"/>
           </p:nvPr>
         </p:nvSpPr>
         <p:spPr>
           <a:xfrm>
-            <a:off x="1524000" y="1122363"/>
-            <a:ext cx="9144000" cy="2892196"/>
+            <a:off x="838200" y="365125"/>
+            <a:ext cx="10515600" cy="1325563"/>
           </a:xfrm>
         </p:spPr>
         <p:txBody>
@@ -5803,8 +5919,115 @@
           <a:lstStyle/>
           <a:p>
             <a:r>
-              <a:rPr lang="en-US" sz="4800" dirty="0"/>
-              <a:t>Final Questions or Comments?</a:t>
+              <a:rPr lang="en-US" sz="3600" dirty="0"/>
+              <a:t>Wrap-up</a:t>
+            </a:r>
+          </a:p>
+        </p:txBody>
+      </p:sp>
+      <p:sp>
+        <p:nvSpPr>
+          <p:cNvPr id="5" name="Content Placeholder 2">
+            <a:extLst>
+              <a:ext uri="{FF2B5EF4-FFF2-40B4-BE49-F238E27FC236}">
+                <a16:creationId xmlns:a16="http://schemas.microsoft.com/office/drawing/2014/main" id="{E8F0EA9A-219C-40FD-AE36-784EE1B77D56}"/>
+              </a:ext>
+            </a:extLst>
+          </p:cNvPr>
+          <p:cNvSpPr>
+            <a:spLocks noGrp="1"/>
+          </p:cNvSpPr>
+          <p:nvPr>
+            <p:ph idx="1"/>
+          </p:nvPr>
+        </p:nvSpPr>
+        <p:spPr>
+          <a:xfrm>
+            <a:off x="838198" y="1525772"/>
+            <a:ext cx="10515601" cy="4651191"/>
+          </a:xfrm>
+        </p:spPr>
+        <p:txBody>
+          <a:bodyPr>
+            <a:normAutofit/>
+          </a:bodyPr>
+          <a:lstStyle/>
+          <a:p>
+            <a:pPr marL="0" indent="0">
+              <a:buNone/>
+            </a:pPr>
+            <a:r>
+              <a:rPr lang="en-US" sz="2000" u="sng" dirty="0"/>
+              <a:t>Wrap-up: </a:t>
+            </a:r>
+          </a:p>
+          <a:p>
+            <a:pPr marL="0" indent="0">
+              <a:spcBef>
+                <a:spcPts val="1800"/>
+              </a:spcBef>
+              <a:buNone/>
+            </a:pPr>
+            <a:r>
+              <a:rPr lang="en-US" sz="2000" dirty="0"/>
+              <a:t>Quiz 1 is due next Wednesday</a:t>
+            </a:r>
+          </a:p>
+          <a:p>
+            <a:pPr>
+              <a:spcBef>
+                <a:spcPts val="0"/>
+              </a:spcBef>
+            </a:pPr>
+            <a:r>
+              <a:rPr lang="en-US" sz="2000" dirty="0"/>
+              <a:t>You can take it up to three times</a:t>
+            </a:r>
+          </a:p>
+          <a:p>
+            <a:pPr>
+              <a:spcBef>
+                <a:spcPts val="0"/>
+              </a:spcBef>
+            </a:pPr>
+            <a:r>
+              <a:rPr lang="en-US" sz="2000" dirty="0"/>
+              <a:t>The best score out of the three will be taken</a:t>
+            </a:r>
+          </a:p>
+          <a:p>
+            <a:pPr>
+              <a:spcBef>
+                <a:spcPts val="0"/>
+              </a:spcBef>
+            </a:pPr>
+            <a:r>
+              <a:rPr lang="en-US" sz="2000" dirty="0"/>
+              <a:t>I would  suggest taking it the first time early so that you can get more out of your study/lecture… we may take it the first time for our lab on Friday</a:t>
+            </a:r>
+          </a:p>
+          <a:p>
+            <a:pPr marL="0" indent="0">
+              <a:spcBef>
+                <a:spcPts val="1800"/>
+              </a:spcBef>
+              <a:buNone/>
+            </a:pPr>
+            <a:r>
+              <a:rPr lang="en-US" sz="2000" dirty="0"/>
+              <a:t>I’m looking for a volunteer (or two) to look at Project 2 setting up a  Website on Azure</a:t>
+            </a:r>
+          </a:p>
+          <a:p>
+            <a:pPr marL="0" indent="0">
+              <a:spcBef>
+                <a:spcPts val="1800"/>
+              </a:spcBef>
+              <a:buNone/>
+            </a:pPr>
+            <a:r>
+              <a:rPr lang="en-US" sz="2000" dirty="0"/>
+              <a:t>How did the video work out? </a:t>
             </a:r>
           </a:p>
         </p:txBody>
@@ -5812,7 +6035,7 @@
     </p:spTree>
     <p:extLst>
       <p:ext uri="{BB962C8B-B14F-4D97-AF65-F5344CB8AC3E}">
-        <p14:creationId xmlns:p14="http://schemas.microsoft.com/office/powerpoint/2010/main" val="3587547239"/>
+        <p14:creationId xmlns:p14="http://schemas.microsoft.com/office/powerpoint/2010/main" val="2036264509"/>
       </p:ext>
     </p:extLst>
   </p:cSld>
@@ -5825,16 +6048,6 @@
 <file path=ppt/slides/slide9.xml><?xml version="1.0" encoding="utf-8"?>
 <p:sld xmlns:a="http://schemas.openxmlformats.org/drawingml/2006/main" xmlns:r="http://schemas.openxmlformats.org/officeDocument/2006/relationships" xmlns:p="http://schemas.openxmlformats.org/presentationml/2006/main">
   <p:cSld>
-    <p:bg>
-      <p:bgPr>
-        <a:solidFill>
-          <a:schemeClr val="bg1">
-            <a:lumMod val="75000"/>
-          </a:schemeClr>
-        </a:solidFill>
-        <a:effectLst/>
-      </p:bgPr>
-    </p:bg>
     <p:spTree>
       <p:nvGrpSpPr>
         <p:cNvPr id="1" name=""/>
@@ -5862,7 +6075,7 @@
         <p:spPr>
           <a:xfrm>
             <a:off x="1524000" y="1122363"/>
-            <a:ext cx="9144000" cy="2387600"/>
+            <a:ext cx="9144000" cy="2892196"/>
           </a:xfrm>
         </p:spPr>
         <p:txBody>
@@ -5873,44 +6086,7 @@
           <a:p>
             <a:r>
               <a:rPr lang="en-US" sz="4800" dirty="0"/>
-              <a:t>End of Session</a:t>
-            </a:r>
-          </a:p>
-        </p:txBody>
-      </p:sp>
-      <p:sp>
-        <p:nvSpPr>
-          <p:cNvPr id="3" name="Subtitle 2"/>
-          <p:cNvSpPr>
-            <a:spLocks noGrp="1"/>
-          </p:cNvSpPr>
-          <p:nvPr>
-            <p:ph type="subTitle" idx="1"/>
-          </p:nvPr>
-        </p:nvSpPr>
-        <p:spPr>
-          <a:xfrm>
-            <a:off x="1524000" y="3602038"/>
-            <a:ext cx="9144000" cy="2198022"/>
-          </a:xfrm>
-        </p:spPr>
-        <p:txBody>
-          <a:bodyPr>
-            <a:normAutofit/>
-          </a:bodyPr>
-          <a:lstStyle/>
-          <a:p>
-            <a:pPr algn="l"/>
-            <a:r>
-              <a:rPr lang="en-US" dirty="0"/>
-              <a:t>Course Number: CPSC-24700</a:t>
-            </a:r>
-          </a:p>
-          <a:p>
-            <a:pPr algn="l"/>
-            <a:r>
-              <a:rPr lang="en-US" dirty="0"/>
-              <a:t>Instructor: Eric Pogue</a:t>
+              <a:t>Final Questions or Comments?</a:t>
             </a:r>
           </a:p>
         </p:txBody>
@@ -5918,7 +6094,7 @@
     </p:spTree>
     <p:extLst>
       <p:ext uri="{BB962C8B-B14F-4D97-AF65-F5344CB8AC3E}">
-        <p14:creationId xmlns:p14="http://schemas.microsoft.com/office/powerpoint/2010/main" val="1130818612"/>
+        <p14:creationId xmlns:p14="http://schemas.microsoft.com/office/powerpoint/2010/main" val="3587547239"/>
       </p:ext>
     </p:extLst>
   </p:cSld>

</xml_diff>